<commit_message>
Add simulation.ipynb and PPT-2
</commit_message>
<xml_diff>
--- a/Grid Network Experienments 2.pptx
+++ b/Grid Network Experienments 2.pptx
@@ -5,13 +5,18 @@
     <p:sldMasterId id="2147483648" r:id="rId1"/>
   </p:sldMasterIdLst>
   <p:notesMasterIdLst>
-    <p:notesMasterId r:id="rId6"/>
+    <p:notesMasterId r:id="rId11"/>
   </p:notesMasterIdLst>
   <p:sldIdLst>
     <p:sldId id="256" r:id="rId2"/>
     <p:sldId id="269" r:id="rId3"/>
     <p:sldId id="271" r:id="rId4"/>
-    <p:sldId id="272" r:id="rId5"/>
+    <p:sldId id="274" r:id="rId5"/>
+    <p:sldId id="275" r:id="rId6"/>
+    <p:sldId id="276" r:id="rId7"/>
+    <p:sldId id="272" r:id="rId8"/>
+    <p:sldId id="278" r:id="rId9"/>
+    <p:sldId id="279" r:id="rId10"/>
   </p:sldIdLst>
   <p:sldSz cx="12192000" cy="6858000"/>
   <p:notesSz cx="6858000" cy="9144000"/>
@@ -200,7 +205,7 @@
           <a:p>
             <a:fld id="{C474165D-EA76-B843-BA22-125360274E71}" type="datetimeFigureOut">
               <a:rPr kumimoji="1" lang="zh-CN" altLang="en-US" smtClean="0"/>
-              <a:t>2021/9/29</a:t>
+              <a:t>2021/10/4</a:t>
             </a:fld>
             <a:endParaRPr kumimoji="1" lang="zh-CN" altLang="en-US"/>
           </a:p>
@@ -614,7 +619,7 @@
           <a:p>
             <a:fld id="{9E0703CF-013D-2742-B85D-75367043BA56}" type="datetimeFigureOut">
               <a:rPr kumimoji="1" lang="zh-CN" altLang="en-US" smtClean="0"/>
-              <a:t>2021/9/29</a:t>
+              <a:t>2021/10/4</a:t>
             </a:fld>
             <a:endParaRPr kumimoji="1" lang="zh-CN" altLang="en-US"/>
           </a:p>
@@ -812,7 +817,7 @@
           <a:p>
             <a:fld id="{9E0703CF-013D-2742-B85D-75367043BA56}" type="datetimeFigureOut">
               <a:rPr kumimoji="1" lang="zh-CN" altLang="en-US" smtClean="0"/>
-              <a:t>2021/9/29</a:t>
+              <a:t>2021/10/4</a:t>
             </a:fld>
             <a:endParaRPr kumimoji="1" lang="zh-CN" altLang="en-US"/>
           </a:p>
@@ -1020,7 +1025,7 @@
           <a:p>
             <a:fld id="{9E0703CF-013D-2742-B85D-75367043BA56}" type="datetimeFigureOut">
               <a:rPr kumimoji="1" lang="zh-CN" altLang="en-US" smtClean="0"/>
-              <a:t>2021/9/29</a:t>
+              <a:t>2021/10/4</a:t>
             </a:fld>
             <a:endParaRPr kumimoji="1" lang="zh-CN" altLang="en-US"/>
           </a:p>
@@ -1218,7 +1223,7 @@
           <a:p>
             <a:fld id="{9E0703CF-013D-2742-B85D-75367043BA56}" type="datetimeFigureOut">
               <a:rPr kumimoji="1" lang="zh-CN" altLang="en-US" smtClean="0"/>
-              <a:t>2021/9/29</a:t>
+              <a:t>2021/10/4</a:t>
             </a:fld>
             <a:endParaRPr kumimoji="1" lang="zh-CN" altLang="en-US"/>
           </a:p>
@@ -1493,7 +1498,7 @@
           <a:p>
             <a:fld id="{9E0703CF-013D-2742-B85D-75367043BA56}" type="datetimeFigureOut">
               <a:rPr kumimoji="1" lang="zh-CN" altLang="en-US" smtClean="0"/>
-              <a:t>2021/9/29</a:t>
+              <a:t>2021/10/4</a:t>
             </a:fld>
             <a:endParaRPr kumimoji="1" lang="zh-CN" altLang="en-US"/>
           </a:p>
@@ -1758,7 +1763,7 @@
           <a:p>
             <a:fld id="{9E0703CF-013D-2742-B85D-75367043BA56}" type="datetimeFigureOut">
               <a:rPr kumimoji="1" lang="zh-CN" altLang="en-US" smtClean="0"/>
-              <a:t>2021/9/29</a:t>
+              <a:t>2021/10/4</a:t>
             </a:fld>
             <a:endParaRPr kumimoji="1" lang="zh-CN" altLang="en-US"/>
           </a:p>
@@ -2170,7 +2175,7 @@
           <a:p>
             <a:fld id="{9E0703CF-013D-2742-B85D-75367043BA56}" type="datetimeFigureOut">
               <a:rPr kumimoji="1" lang="zh-CN" altLang="en-US" smtClean="0"/>
-              <a:t>2021/9/29</a:t>
+              <a:t>2021/10/4</a:t>
             </a:fld>
             <a:endParaRPr kumimoji="1" lang="zh-CN" altLang="en-US"/>
           </a:p>
@@ -2311,7 +2316,7 @@
           <a:p>
             <a:fld id="{9E0703CF-013D-2742-B85D-75367043BA56}" type="datetimeFigureOut">
               <a:rPr kumimoji="1" lang="zh-CN" altLang="en-US" smtClean="0"/>
-              <a:t>2021/9/29</a:t>
+              <a:t>2021/10/4</a:t>
             </a:fld>
             <a:endParaRPr kumimoji="1" lang="zh-CN" altLang="en-US"/>
           </a:p>
@@ -2424,7 +2429,7 @@
           <a:p>
             <a:fld id="{9E0703CF-013D-2742-B85D-75367043BA56}" type="datetimeFigureOut">
               <a:rPr kumimoji="1" lang="zh-CN" altLang="en-US" smtClean="0"/>
-              <a:t>2021/9/29</a:t>
+              <a:t>2021/10/4</a:t>
             </a:fld>
             <a:endParaRPr kumimoji="1" lang="zh-CN" altLang="en-US"/>
           </a:p>
@@ -2735,7 +2740,7 @@
           <a:p>
             <a:fld id="{9E0703CF-013D-2742-B85D-75367043BA56}" type="datetimeFigureOut">
               <a:rPr kumimoji="1" lang="zh-CN" altLang="en-US" smtClean="0"/>
-              <a:t>2021/9/29</a:t>
+              <a:t>2021/10/4</a:t>
             </a:fld>
             <a:endParaRPr kumimoji="1" lang="zh-CN" altLang="en-US"/>
           </a:p>
@@ -3023,7 +3028,7 @@
           <a:p>
             <a:fld id="{9E0703CF-013D-2742-B85D-75367043BA56}" type="datetimeFigureOut">
               <a:rPr kumimoji="1" lang="zh-CN" altLang="en-US" smtClean="0"/>
-              <a:t>2021/9/29</a:t>
+              <a:t>2021/10/4</a:t>
             </a:fld>
             <a:endParaRPr kumimoji="1" lang="zh-CN" altLang="en-US"/>
           </a:p>
@@ -3264,7 +3269,7 @@
           <a:p>
             <a:fld id="{9E0703CF-013D-2742-B85D-75367043BA56}" type="datetimeFigureOut">
               <a:rPr kumimoji="1" lang="zh-CN" altLang="en-US" smtClean="0"/>
-              <a:t>2021/9/29</a:t>
+              <a:t>2021/10/4</a:t>
             </a:fld>
             <a:endParaRPr kumimoji="1" lang="zh-CN" altLang="en-US"/>
           </a:p>
@@ -3747,7 +3752,7 @@
           <a:p>
             <a:fld id="{B4F26AAF-4606-EA46-91F3-16F8CEF58196}" type="datetime1">
               <a:rPr kumimoji="1" lang="zh-CN" altLang="en-US" smtClean="0"/>
-              <a:t>2021/9/29</a:t>
+              <a:t>2021/10/4</a:t>
             </a:fld>
             <a:endParaRPr kumimoji="1" lang="zh-CN" altLang="en-US" dirty="0"/>
           </a:p>
@@ -3935,110 +3940,71 @@
           </a:p>
         </p:txBody>
       </p:sp>
-      <mc:AlternateContent xmlns:mc="http://schemas.openxmlformats.org/markup-compatibility/2006" xmlns:a14="http://schemas.microsoft.com/office/drawing/2010/main">
-        <mc:Choice Requires="a14">
-          <p:sp>
-            <p:nvSpPr>
-              <p:cNvPr id="3" name="内容占位符 2">
-                <a:extLst>
-                  <a:ext uri="{FF2B5EF4-FFF2-40B4-BE49-F238E27FC236}">
-                    <a16:creationId xmlns:a16="http://schemas.microsoft.com/office/drawing/2014/main" id="{D4890FD2-9705-9F40-A0D8-38C5F7AC14E4}"/>
-                  </a:ext>
-                </a:extLst>
-              </p:cNvPr>
-              <p:cNvSpPr>
-                <a:spLocks noGrp="1"/>
-              </p:cNvSpPr>
-              <p:nvPr>
-                <p:ph sz="half" idx="1"/>
-              </p:nvPr>
-            </p:nvSpPr>
-            <p:spPr/>
-            <p:txBody>
-              <a:bodyPr/>
-              <a:lstStyle/>
-              <a:p>
-                <a:r>
-                  <a:rPr kumimoji="1" lang="en-US" altLang="zh-CN"/>
-                  <a:t>Time of step 0: 127.653s</a:t>
-                </a:r>
-              </a:p>
-              <a:p>
-                <a:r>
-                  <a:rPr kumimoji="1" lang="en-US" altLang="zh-CN"/>
-                  <a:t>Time of step 1: 3.200s</a:t>
-                </a:r>
-              </a:p>
-              <a:p>
-                <a:r>
-                  <a:rPr kumimoji="1" lang="en-US" altLang="zh-CN"/>
-                  <a:t>Number of iterations: 14 (with absolute error </a:t>
-                </a:r>
-                <a14:m>
-                  <m:oMath xmlns:m="http://schemas.openxmlformats.org/officeDocument/2006/math">
-                    <m:r>
-                      <a:rPr kumimoji="1" lang="en-US" altLang="zh-CN" i="1">
-                        <a:latin typeface="Cambria Math" panose="02040503050406030204" pitchFamily="18" charset="0"/>
-                      </a:rPr>
-                      <m:t>𝜖</m:t>
-                    </m:r>
-                    <m:r>
-                      <a:rPr kumimoji="1" lang="en-US" altLang="zh-CN" i="1">
-                        <a:latin typeface="Cambria Math" panose="02040503050406030204" pitchFamily="18" charset="0"/>
-                      </a:rPr>
-                      <m:t>=0.01</m:t>
-                    </m:r>
-                  </m:oMath>
-                </a14:m>
-                <a:r>
-                  <a:rPr kumimoji="1" lang="en-US" altLang="zh-CN"/>
-                  <a:t>)</a:t>
-                </a:r>
-                <a:endParaRPr kumimoji="1" lang="zh-CN" altLang="en-US"/>
-              </a:p>
-            </p:txBody>
-          </p:sp>
-        </mc:Choice>
-        <mc:Fallback xmlns="">
-          <p:sp>
-            <p:nvSpPr>
-              <p:cNvPr id="3" name="内容占位符 2">
-                <a:extLst>
-                  <a:ext uri="{FF2B5EF4-FFF2-40B4-BE49-F238E27FC236}">
-                    <a16:creationId xmlns:a16="http://schemas.microsoft.com/office/drawing/2014/main" id="{D4890FD2-9705-9F40-A0D8-38C5F7AC14E4}"/>
-                  </a:ext>
-                </a:extLst>
-              </p:cNvPr>
-              <p:cNvSpPr>
-                <a:spLocks noGrp="1" noRot="1" noChangeAspect="1" noMove="1" noResize="1" noEditPoints="1" noAdjustHandles="1" noChangeArrowheads="1" noChangeShapeType="1" noTextEdit="1"/>
-              </p:cNvSpPr>
-              <p:nvPr>
-                <p:ph sz="half" idx="1"/>
-              </p:nvPr>
-            </p:nvSpPr>
-            <p:spPr>
-              <a:blipFill>
-                <a:blip r:embed="rId2"/>
-                <a:stretch>
-                  <a:fillRect l="-2200" t="-2326"/>
-                </a:stretch>
-              </a:blipFill>
-            </p:spPr>
-            <p:txBody>
-              <a:bodyPr/>
-              <a:lstStyle/>
-              <a:p>
-                <a:r>
-                  <a:rPr lang="zh-CN" altLang="en-US">
-                    <a:noFill/>
-                  </a:rPr>
-                  <a:t> </a:t>
-                </a:r>
-              </a:p>
-            </p:txBody>
-          </p:sp>
-        </mc:Fallback>
-      </mc:AlternateContent>
+      <p:sp>
+        <p:nvSpPr>
+          <p:cNvPr id="3" name="内容占位符 2">
+            <a:extLst>
+              <a:ext uri="{FF2B5EF4-FFF2-40B4-BE49-F238E27FC236}">
+                <a16:creationId xmlns:a16="http://schemas.microsoft.com/office/drawing/2014/main" id="{D4890FD2-9705-9F40-A0D8-38C5F7AC14E4}"/>
+              </a:ext>
+            </a:extLst>
+          </p:cNvPr>
+          <p:cNvSpPr>
+            <a:spLocks noGrp="1"/>
+          </p:cNvSpPr>
+          <p:nvPr>
+            <p:ph sz="half" idx="1"/>
+          </p:nvPr>
+        </p:nvSpPr>
+        <p:spPr/>
+        <p:txBody>
+          <a:bodyPr/>
+          <a:lstStyle/>
+          <a:p>
+            <a:r>
+              <a:rPr kumimoji="1" lang="en-US" altLang="zh-CN"/>
+              <a:t>Time of step 0: 127.653s</a:t>
+            </a:r>
+          </a:p>
+          <a:p>
+            <a:r>
+              <a:rPr kumimoji="1" lang="en-US" altLang="zh-CN"/>
+              <a:t>Time of step 1: 3.200s</a:t>
+            </a:r>
+          </a:p>
+          <a:p>
+            <a:r>
+              <a:rPr kumimoji="1" lang="en-US" altLang="zh-CN"/>
+              <a:t>Number of iterations: 14 (with absolute error</a:t>
+            </a:r>
+            <a:r>
+              <a:rPr kumimoji="1" lang="zh-CN" altLang="en-US"/>
+              <a:t> </a:t>
+            </a:r>
+            <a:r>
+              <a:rPr kumimoji="1" lang="en-US" altLang="zh-CN"/>
+              <a:t>ε</a:t>
+            </a:r>
+            <a:r>
+              <a:rPr kumimoji="1" lang="zh-CN" altLang="en-US"/>
+              <a:t> </a:t>
+            </a:r>
+            <a:r>
+              <a:rPr kumimoji="1" lang="en-US" altLang="zh-CN"/>
+              <a:t>=</a:t>
+            </a:r>
+            <a:r>
+              <a:rPr kumimoji="1" lang="zh-CN" altLang="en-US"/>
+              <a:t> </a:t>
+            </a:r>
+            <a:r>
+              <a:rPr kumimoji="1" lang="en-US" altLang="zh-CN"/>
+              <a:t>0.01)</a:t>
+            </a:r>
+            <a:endParaRPr kumimoji="1" lang="zh-CN" altLang="en-US"/>
+          </a:p>
+        </p:txBody>
+      </p:sp>
       <p:pic>
         <p:nvPicPr>
           <p:cNvPr id="6" name="内容占位符 5">
@@ -4056,7 +4022,7 @@
           </p:nvPr>
         </p:nvPicPr>
         <p:blipFill>
-          <a:blip r:embed="rId3"/>
+          <a:blip r:embed="rId2"/>
           <a:stretch>
             <a:fillRect/>
           </a:stretch>
@@ -4103,6 +4069,471 @@
           <p:cNvPr id="2" name="标题 1">
             <a:extLst>
               <a:ext uri="{FF2B5EF4-FFF2-40B4-BE49-F238E27FC236}">
+                <a16:creationId xmlns:a16="http://schemas.microsoft.com/office/drawing/2014/main" id="{C0D9670E-8772-DA44-86D8-432F12CA3932}"/>
+              </a:ext>
+            </a:extLst>
+          </p:cNvPr>
+          <p:cNvSpPr>
+            <a:spLocks noGrp="1"/>
+          </p:cNvSpPr>
+          <p:nvPr>
+            <p:ph type="title"/>
+          </p:nvPr>
+        </p:nvSpPr>
+        <p:spPr/>
+        <p:txBody>
+          <a:bodyPr/>
+          <a:lstStyle/>
+          <a:p>
+            <a:r>
+              <a:rPr kumimoji="1" lang="en-US" altLang="zh-CN"/>
+              <a:t>K-means</a:t>
+            </a:r>
+            <a:r>
+              <a:rPr kumimoji="1" lang="zh-CN" altLang="en-US"/>
+              <a:t> </a:t>
+            </a:r>
+            <a:r>
+              <a:rPr kumimoji="1" lang="en-US" altLang="zh-CN"/>
+              <a:t>Clustering</a:t>
+            </a:r>
+            <a:endParaRPr kumimoji="1" lang="zh-CN" altLang="en-US"/>
+          </a:p>
+        </p:txBody>
+      </p:sp>
+      <p:sp>
+        <p:nvSpPr>
+          <p:cNvPr id="3" name="内容占位符 2">
+            <a:extLst>
+              <a:ext uri="{FF2B5EF4-FFF2-40B4-BE49-F238E27FC236}">
+                <a16:creationId xmlns:a16="http://schemas.microsoft.com/office/drawing/2014/main" id="{E40528C6-69E9-B54E-9FB9-90D0E13D9D49}"/>
+              </a:ext>
+            </a:extLst>
+          </p:cNvPr>
+          <p:cNvSpPr>
+            <a:spLocks noGrp="1"/>
+          </p:cNvSpPr>
+          <p:nvPr>
+            <p:ph sz="half" idx="1"/>
+          </p:nvPr>
+        </p:nvSpPr>
+        <p:spPr/>
+        <p:txBody>
+          <a:bodyPr/>
+          <a:lstStyle/>
+          <a:p>
+            <a:pPr marL="514350" indent="-514350">
+              <a:buFont typeface="+mj-lt"/>
+              <a:buAutoNum type="arabicPeriod"/>
+            </a:pPr>
+            <a:r>
+              <a:rPr kumimoji="1" lang="en-US" altLang="zh-CN"/>
+              <a:t>Initialize the center randomly for each cluster.</a:t>
+            </a:r>
+          </a:p>
+          <a:p>
+            <a:pPr marL="514350" indent="-514350">
+              <a:buFont typeface="+mj-lt"/>
+              <a:buAutoNum type="arabicPeriod"/>
+            </a:pPr>
+            <a:r>
+              <a:rPr kumimoji="1" lang="en-US" altLang="zh-CN"/>
+              <a:t>Assign each point to the nearest center.</a:t>
+            </a:r>
+          </a:p>
+          <a:p>
+            <a:pPr marL="514350" indent="-514350">
+              <a:buFont typeface="+mj-lt"/>
+              <a:buAutoNum type="arabicPeriod"/>
+            </a:pPr>
+            <a:r>
+              <a:rPr kumimoji="1" lang="en-US" altLang="zh-CN"/>
+              <a:t>Calculate the </a:t>
+            </a:r>
+            <a:r>
+              <a:rPr kumimoji="1" lang="en-US" altLang="zh-CN" b="1"/>
+              <a:t>means of k clusters</a:t>
+            </a:r>
+            <a:r>
+              <a:rPr kumimoji="1" lang="en-US" altLang="zh-CN"/>
+              <a:t> as its new center.</a:t>
+            </a:r>
+          </a:p>
+          <a:p>
+            <a:pPr marL="514350" indent="-514350">
+              <a:buFont typeface="+mj-lt"/>
+              <a:buAutoNum type="arabicPeriod"/>
+            </a:pPr>
+            <a:r>
+              <a:rPr kumimoji="1" lang="en-US" altLang="zh-CN"/>
+              <a:t>Turn to step 2.</a:t>
+            </a:r>
+          </a:p>
+          <a:p>
+            <a:pPr marL="0" indent="0">
+              <a:buNone/>
+            </a:pPr>
+            <a:r>
+              <a:rPr kumimoji="1" lang="en-US" altLang="zh-CN">
+                <a:hlinkClick r:id="rId2"/>
+              </a:rPr>
+              <a:t>k_means_clustering.py</a:t>
+            </a:r>
+            <a:endParaRPr kumimoji="1" lang="en-US" altLang="zh-CN"/>
+          </a:p>
+        </p:txBody>
+      </p:sp>
+      <p:pic>
+        <p:nvPicPr>
+          <p:cNvPr id="9" name="内容占位符 8">
+            <a:extLst>
+              <a:ext uri="{FF2B5EF4-FFF2-40B4-BE49-F238E27FC236}">
+                <a16:creationId xmlns:a16="http://schemas.microsoft.com/office/drawing/2014/main" id="{F58FC055-94BE-EF40-A40D-936166F8165C}"/>
+              </a:ext>
+            </a:extLst>
+          </p:cNvPr>
+          <p:cNvPicPr>
+            <a:picLocks noGrp="1" noChangeAspect="1"/>
+          </p:cNvPicPr>
+          <p:nvPr>
+            <p:ph sz="half" idx="2"/>
+          </p:nvPr>
+        </p:nvPicPr>
+        <p:blipFill>
+          <a:blip r:embed="rId3"/>
+          <a:stretch>
+            <a:fillRect/>
+          </a:stretch>
+        </p:blipFill>
+        <p:spPr>
+          <a:xfrm>
+            <a:off x="6172200" y="2058194"/>
+            <a:ext cx="5181600" cy="3886200"/>
+          </a:xfrm>
+        </p:spPr>
+      </p:pic>
+    </p:spTree>
+    <p:extLst>
+      <p:ext uri="{BB962C8B-B14F-4D97-AF65-F5344CB8AC3E}">
+        <p14:creationId xmlns:p14="http://schemas.microsoft.com/office/powerpoint/2010/main" val="1106377428"/>
+      </p:ext>
+    </p:extLst>
+  </p:cSld>
+  <p:clrMapOvr>
+    <a:masterClrMapping/>
+  </p:clrMapOvr>
+</p:sld>
+</file>
+
+<file path=ppt/slides/slide5.xml><?xml version="1.0" encoding="utf-8"?>
+<p:sld xmlns:a="http://schemas.openxmlformats.org/drawingml/2006/main" xmlns:r="http://schemas.openxmlformats.org/officeDocument/2006/relationships" xmlns:p="http://schemas.openxmlformats.org/presentationml/2006/main">
+  <p:cSld>
+    <p:spTree>
+      <p:nvGrpSpPr>
+        <p:cNvPr id="1" name=""/>
+        <p:cNvGrpSpPr/>
+        <p:nvPr/>
+      </p:nvGrpSpPr>
+      <p:grpSpPr>
+        <a:xfrm>
+          <a:off x="0" y="0"/>
+          <a:ext cx="0" cy="0"/>
+          <a:chOff x="0" y="0"/>
+          <a:chExt cx="0" cy="0"/>
+        </a:xfrm>
+      </p:grpSpPr>
+      <p:sp>
+        <p:nvSpPr>
+          <p:cNvPr id="2" name="标题 1">
+            <a:extLst>
+              <a:ext uri="{FF2B5EF4-FFF2-40B4-BE49-F238E27FC236}">
+                <a16:creationId xmlns:a16="http://schemas.microsoft.com/office/drawing/2014/main" id="{C0D9670E-8772-DA44-86D8-432F12CA3932}"/>
+              </a:ext>
+            </a:extLst>
+          </p:cNvPr>
+          <p:cNvSpPr>
+            <a:spLocks noGrp="1"/>
+          </p:cNvSpPr>
+          <p:nvPr>
+            <p:ph type="title"/>
+          </p:nvPr>
+        </p:nvSpPr>
+        <p:spPr/>
+        <p:txBody>
+          <a:bodyPr/>
+          <a:lstStyle/>
+          <a:p>
+            <a:r>
+              <a:rPr kumimoji="1" lang="en-US" altLang="zh-CN"/>
+              <a:t>K-medoids</a:t>
+            </a:r>
+            <a:r>
+              <a:rPr kumimoji="1" lang="zh-CN" altLang="en-US"/>
+              <a:t> </a:t>
+            </a:r>
+            <a:r>
+              <a:rPr kumimoji="1" lang="en-US" altLang="zh-CN"/>
+              <a:t>Clustering</a:t>
+            </a:r>
+            <a:endParaRPr kumimoji="1" lang="zh-CN" altLang="en-US"/>
+          </a:p>
+        </p:txBody>
+      </p:sp>
+      <p:sp>
+        <p:nvSpPr>
+          <p:cNvPr id="3" name="内容占位符 2">
+            <a:extLst>
+              <a:ext uri="{FF2B5EF4-FFF2-40B4-BE49-F238E27FC236}">
+                <a16:creationId xmlns:a16="http://schemas.microsoft.com/office/drawing/2014/main" id="{E40528C6-69E9-B54E-9FB9-90D0E13D9D49}"/>
+              </a:ext>
+            </a:extLst>
+          </p:cNvPr>
+          <p:cNvSpPr>
+            <a:spLocks noGrp="1"/>
+          </p:cNvSpPr>
+          <p:nvPr>
+            <p:ph sz="half" idx="1"/>
+          </p:nvPr>
+        </p:nvSpPr>
+        <p:spPr/>
+        <p:txBody>
+          <a:bodyPr>
+            <a:normAutofit lnSpcReduction="10000"/>
+          </a:bodyPr>
+          <a:lstStyle/>
+          <a:p>
+            <a:pPr marL="514350" indent="-514350">
+              <a:buFont typeface="+mj-lt"/>
+              <a:buAutoNum type="arabicPeriod"/>
+            </a:pPr>
+            <a:r>
+              <a:rPr kumimoji="1" lang="en-US" altLang="zh-CN"/>
+              <a:t>Initialize the center randomly for each cluster.</a:t>
+            </a:r>
+          </a:p>
+          <a:p>
+            <a:pPr marL="514350" indent="-514350">
+              <a:buFont typeface="+mj-lt"/>
+              <a:buAutoNum type="arabicPeriod"/>
+            </a:pPr>
+            <a:r>
+              <a:rPr kumimoji="1" lang="en-US" altLang="zh-CN"/>
+              <a:t>Assign each point to the nearest center.</a:t>
+            </a:r>
+          </a:p>
+          <a:p>
+            <a:pPr marL="514350" indent="-514350">
+              <a:buFont typeface="+mj-lt"/>
+              <a:buAutoNum type="arabicPeriod"/>
+            </a:pPr>
+            <a:r>
+              <a:rPr kumimoji="1" lang="en-US" altLang="zh-CN"/>
+              <a:t>Find </a:t>
+            </a:r>
+            <a:r>
+              <a:rPr kumimoji="1" lang="en-US" altLang="zh-CN" b="1"/>
+              <a:t>an actual data point</a:t>
+            </a:r>
+            <a:r>
+              <a:rPr kumimoji="1" lang="en-US" altLang="zh-CN"/>
+              <a:t> in each cluster that minimize the dissimilarity as the new center (say medoid).</a:t>
+            </a:r>
+          </a:p>
+          <a:p>
+            <a:pPr marL="514350" indent="-514350">
+              <a:buFont typeface="+mj-lt"/>
+              <a:buAutoNum type="arabicPeriod"/>
+            </a:pPr>
+            <a:r>
+              <a:rPr kumimoji="1" lang="en-US" altLang="zh-CN"/>
+              <a:t>Turn to step 2.</a:t>
+            </a:r>
+          </a:p>
+          <a:p>
+            <a:pPr marL="0" indent="0">
+              <a:buNone/>
+            </a:pPr>
+            <a:r>
+              <a:rPr kumimoji="1" lang="en-US" altLang="zh-CN">
+                <a:hlinkClick r:id="rId2"/>
+              </a:rPr>
+              <a:t>k_medoids_clustering.py</a:t>
+            </a:r>
+            <a:endParaRPr kumimoji="1" lang="en-US" altLang="zh-CN"/>
+          </a:p>
+        </p:txBody>
+      </p:sp>
+      <p:pic>
+        <p:nvPicPr>
+          <p:cNvPr id="8" name="内容占位符 7">
+            <a:extLst>
+              <a:ext uri="{FF2B5EF4-FFF2-40B4-BE49-F238E27FC236}">
+                <a16:creationId xmlns:a16="http://schemas.microsoft.com/office/drawing/2014/main" id="{CBEE2146-5FA1-744B-9CE7-9BF8C431DBDF}"/>
+              </a:ext>
+            </a:extLst>
+          </p:cNvPr>
+          <p:cNvPicPr>
+            <a:picLocks noGrp="1" noChangeAspect="1"/>
+          </p:cNvPicPr>
+          <p:nvPr>
+            <p:ph sz="half" idx="2"/>
+          </p:nvPr>
+        </p:nvPicPr>
+        <p:blipFill>
+          <a:blip r:embed="rId3"/>
+          <a:stretch>
+            <a:fillRect/>
+          </a:stretch>
+        </p:blipFill>
+        <p:spPr>
+          <a:xfrm>
+            <a:off x="6172200" y="2058194"/>
+            <a:ext cx="5181600" cy="3886200"/>
+          </a:xfrm>
+        </p:spPr>
+      </p:pic>
+    </p:spTree>
+    <p:extLst>
+      <p:ext uri="{BB962C8B-B14F-4D97-AF65-F5344CB8AC3E}">
+        <p14:creationId xmlns:p14="http://schemas.microsoft.com/office/powerpoint/2010/main" val="1348482258"/>
+      </p:ext>
+    </p:extLst>
+  </p:cSld>
+  <p:clrMapOvr>
+    <a:masterClrMapping/>
+  </p:clrMapOvr>
+</p:sld>
+</file>
+
+<file path=ppt/slides/slide6.xml><?xml version="1.0" encoding="utf-8"?>
+<p:sld xmlns:a="http://schemas.openxmlformats.org/drawingml/2006/main" xmlns:r="http://schemas.openxmlformats.org/officeDocument/2006/relationships" xmlns:p="http://schemas.openxmlformats.org/presentationml/2006/main">
+  <p:cSld>
+    <p:spTree>
+      <p:nvGrpSpPr>
+        <p:cNvPr id="1" name=""/>
+        <p:cNvGrpSpPr/>
+        <p:nvPr/>
+      </p:nvGrpSpPr>
+      <p:grpSpPr>
+        <a:xfrm>
+          <a:off x="0" y="0"/>
+          <a:ext cx="0" cy="0"/>
+          <a:chOff x="0" y="0"/>
+          <a:chExt cx="0" cy="0"/>
+        </a:xfrm>
+      </p:grpSpPr>
+      <p:sp>
+        <p:nvSpPr>
+          <p:cNvPr id="2" name="标题 1">
+            <a:extLst>
+              <a:ext uri="{FF2B5EF4-FFF2-40B4-BE49-F238E27FC236}">
+                <a16:creationId xmlns:a16="http://schemas.microsoft.com/office/drawing/2014/main" id="{358F7A91-4708-7945-8BA6-0A90BB32DA6A}"/>
+              </a:ext>
+            </a:extLst>
+          </p:cNvPr>
+          <p:cNvSpPr>
+            <a:spLocks noGrp="1"/>
+          </p:cNvSpPr>
+          <p:nvPr>
+            <p:ph type="title"/>
+          </p:nvPr>
+        </p:nvSpPr>
+        <p:spPr/>
+        <p:txBody>
+          <a:bodyPr/>
+          <a:lstStyle/>
+          <a:p>
+            <a:r>
+              <a:rPr kumimoji="1" lang="en-US" altLang="zh-CN"/>
+              <a:t>Advantages of K-medoids Clustering</a:t>
+            </a:r>
+            <a:endParaRPr kumimoji="1" lang="zh-CN" altLang="en-US"/>
+          </a:p>
+        </p:txBody>
+      </p:sp>
+      <p:sp>
+        <p:nvSpPr>
+          <p:cNvPr id="3" name="内容占位符 2">
+            <a:extLst>
+              <a:ext uri="{FF2B5EF4-FFF2-40B4-BE49-F238E27FC236}">
+                <a16:creationId xmlns:a16="http://schemas.microsoft.com/office/drawing/2014/main" id="{E3F03171-BB68-E547-9612-DCE2656A5632}"/>
+              </a:ext>
+            </a:extLst>
+          </p:cNvPr>
+          <p:cNvSpPr>
+            <a:spLocks noGrp="1"/>
+          </p:cNvSpPr>
+          <p:nvPr>
+            <p:ph idx="1"/>
+          </p:nvPr>
+        </p:nvSpPr>
+        <p:spPr/>
+        <p:txBody>
+          <a:bodyPr/>
+          <a:lstStyle/>
+          <a:p>
+            <a:r>
+              <a:rPr kumimoji="1" lang="en-US" altLang="zh-CN"/>
+              <a:t>Distance only needed.</a:t>
+            </a:r>
+          </a:p>
+          <a:p>
+            <a:pPr lvl="1"/>
+            <a:r>
+              <a:rPr kumimoji="1" lang="en-US" altLang="zh-CN"/>
+              <a:t>Maybe we can define the distance between ODs with simulation results instead of using specific features.</a:t>
+            </a:r>
+          </a:p>
+          <a:p>
+            <a:r>
+              <a:rPr kumimoji="1" lang="en-US" altLang="zh-CN"/>
+              <a:t>Robust to noise.</a:t>
+            </a:r>
+          </a:p>
+          <a:p>
+            <a:r>
+              <a:rPr lang="en" altLang="zh-CN"/>
+              <a:t>Interpretability.</a:t>
+            </a:r>
+            <a:endParaRPr kumimoji="1" lang="zh-CN" altLang="en-US"/>
+          </a:p>
+        </p:txBody>
+      </p:sp>
+    </p:spTree>
+    <p:extLst>
+      <p:ext uri="{BB962C8B-B14F-4D97-AF65-F5344CB8AC3E}">
+        <p14:creationId xmlns:p14="http://schemas.microsoft.com/office/powerpoint/2010/main" val="1647285603"/>
+      </p:ext>
+    </p:extLst>
+  </p:cSld>
+  <p:clrMapOvr>
+    <a:masterClrMapping/>
+  </p:clrMapOvr>
+</p:sld>
+</file>
+
+<file path=ppt/slides/slide7.xml><?xml version="1.0" encoding="utf-8"?>
+<p:sld xmlns:a="http://schemas.openxmlformats.org/drawingml/2006/main" xmlns:r="http://schemas.openxmlformats.org/officeDocument/2006/relationships" xmlns:p="http://schemas.openxmlformats.org/presentationml/2006/main">
+  <p:cSld>
+    <p:spTree>
+      <p:nvGrpSpPr>
+        <p:cNvPr id="1" name=""/>
+        <p:cNvGrpSpPr/>
+        <p:nvPr/>
+      </p:nvGrpSpPr>
+      <p:grpSpPr>
+        <a:xfrm>
+          <a:off x="0" y="0"/>
+          <a:ext cx="0" cy="0"/>
+          <a:chOff x="0" y="0"/>
+          <a:chExt cx="0" cy="0"/>
+        </a:xfrm>
+      </p:grpSpPr>
+      <p:sp>
+        <p:nvSpPr>
+          <p:cNvPr id="2" name="标题 1">
+            <a:extLst>
+              <a:ext uri="{FF2B5EF4-FFF2-40B4-BE49-F238E27FC236}">
                 <a16:creationId xmlns:a16="http://schemas.microsoft.com/office/drawing/2014/main" id="{4F68B799-EDB2-C448-A23E-FADA3EFDA1BD}"/>
               </a:ext>
             </a:extLst>
@@ -4219,6 +4650,252 @@
     <p:extLst>
       <p:ext uri="{BB962C8B-B14F-4D97-AF65-F5344CB8AC3E}">
         <p14:creationId xmlns:p14="http://schemas.microsoft.com/office/powerpoint/2010/main" val="2964995721"/>
+      </p:ext>
+    </p:extLst>
+  </p:cSld>
+  <p:clrMapOvr>
+    <a:masterClrMapping/>
+  </p:clrMapOvr>
+</p:sld>
+</file>
+
+<file path=ppt/slides/slide8.xml><?xml version="1.0" encoding="utf-8"?>
+<p:sld xmlns:a="http://schemas.openxmlformats.org/drawingml/2006/main" xmlns:r="http://schemas.openxmlformats.org/officeDocument/2006/relationships" xmlns:p="http://schemas.openxmlformats.org/presentationml/2006/main">
+  <p:cSld>
+    <p:spTree>
+      <p:nvGrpSpPr>
+        <p:cNvPr id="1" name=""/>
+        <p:cNvGrpSpPr/>
+        <p:nvPr/>
+      </p:nvGrpSpPr>
+      <p:grpSpPr>
+        <a:xfrm>
+          <a:off x="0" y="0"/>
+          <a:ext cx="0" cy="0"/>
+          <a:chOff x="0" y="0"/>
+          <a:chExt cx="0" cy="0"/>
+        </a:xfrm>
+      </p:grpSpPr>
+      <p:sp>
+        <p:nvSpPr>
+          <p:cNvPr id="2" name="标题 1">
+            <a:extLst>
+              <a:ext uri="{FF2B5EF4-FFF2-40B4-BE49-F238E27FC236}">
+                <a16:creationId xmlns:a16="http://schemas.microsoft.com/office/drawing/2014/main" id="{BA5FCD68-F2F5-F946-80E9-16E0E9FE18A1}"/>
+              </a:ext>
+            </a:extLst>
+          </p:cNvPr>
+          <p:cNvSpPr>
+            <a:spLocks noGrp="1"/>
+          </p:cNvSpPr>
+          <p:nvPr>
+            <p:ph type="title"/>
+          </p:nvPr>
+        </p:nvSpPr>
+        <p:spPr/>
+        <p:txBody>
+          <a:bodyPr/>
+          <a:lstStyle/>
+          <a:p>
+            <a:r>
+              <a:rPr kumimoji="1" lang="en-US" altLang="zh-CN"/>
+              <a:t>Fuzzy Clustering</a:t>
+            </a:r>
+            <a:endParaRPr kumimoji="1" lang="zh-CN" altLang="en-US"/>
+          </a:p>
+        </p:txBody>
+      </p:sp>
+      <p:pic>
+        <p:nvPicPr>
+          <p:cNvPr id="6" name="内容占位符 5">
+            <a:extLst>
+              <a:ext uri="{FF2B5EF4-FFF2-40B4-BE49-F238E27FC236}">
+                <a16:creationId xmlns:a16="http://schemas.microsoft.com/office/drawing/2014/main" id="{E469642D-708D-7040-B61F-D88B66929F3C}"/>
+              </a:ext>
+            </a:extLst>
+          </p:cNvPr>
+          <p:cNvPicPr>
+            <a:picLocks noGrp="1" noChangeAspect="1"/>
+          </p:cNvPicPr>
+          <p:nvPr>
+            <p:ph sz="half" idx="1"/>
+          </p:nvPr>
+        </p:nvPicPr>
+        <p:blipFill>
+          <a:blip r:embed="rId2"/>
+          <a:stretch>
+            <a:fillRect/>
+          </a:stretch>
+        </p:blipFill>
+        <p:spPr>
+          <a:xfrm>
+            <a:off x="838200" y="2058194"/>
+            <a:ext cx="5181600" cy="3886200"/>
+          </a:xfrm>
+        </p:spPr>
+      </p:pic>
+      <p:pic>
+        <p:nvPicPr>
+          <p:cNvPr id="8" name="内容占位符 7">
+            <a:extLst>
+              <a:ext uri="{FF2B5EF4-FFF2-40B4-BE49-F238E27FC236}">
+                <a16:creationId xmlns:a16="http://schemas.microsoft.com/office/drawing/2014/main" id="{B9BA6A5A-74A6-234C-BBB0-5B61E2E4E210}"/>
+              </a:ext>
+            </a:extLst>
+          </p:cNvPr>
+          <p:cNvPicPr>
+            <a:picLocks noGrp="1" noChangeAspect="1"/>
+          </p:cNvPicPr>
+          <p:nvPr>
+            <p:ph sz="half" idx="2"/>
+          </p:nvPr>
+        </p:nvPicPr>
+        <p:blipFill>
+          <a:blip r:embed="rId3"/>
+          <a:stretch>
+            <a:fillRect/>
+          </a:stretch>
+        </p:blipFill>
+        <p:spPr>
+          <a:xfrm>
+            <a:off x="6172200" y="2058194"/>
+            <a:ext cx="5181600" cy="3886200"/>
+          </a:xfrm>
+        </p:spPr>
+      </p:pic>
+    </p:spTree>
+    <p:extLst>
+      <p:ext uri="{BB962C8B-B14F-4D97-AF65-F5344CB8AC3E}">
+        <p14:creationId xmlns:p14="http://schemas.microsoft.com/office/powerpoint/2010/main" val="3274304036"/>
+      </p:ext>
+    </p:extLst>
+  </p:cSld>
+  <p:clrMapOvr>
+    <a:masterClrMapping/>
+  </p:clrMapOvr>
+</p:sld>
+</file>
+
+<file path=ppt/slides/slide9.xml><?xml version="1.0" encoding="utf-8"?>
+<p:sld xmlns:a="http://schemas.openxmlformats.org/drawingml/2006/main" xmlns:r="http://schemas.openxmlformats.org/officeDocument/2006/relationships" xmlns:p="http://schemas.openxmlformats.org/presentationml/2006/main">
+  <p:cSld>
+    <p:spTree>
+      <p:nvGrpSpPr>
+        <p:cNvPr id="1" name=""/>
+        <p:cNvGrpSpPr/>
+        <p:nvPr/>
+      </p:nvGrpSpPr>
+      <p:grpSpPr>
+        <a:xfrm>
+          <a:off x="0" y="0"/>
+          <a:ext cx="0" cy="0"/>
+          <a:chOff x="0" y="0"/>
+          <a:chExt cx="0" cy="0"/>
+        </a:xfrm>
+      </p:grpSpPr>
+      <p:sp>
+        <p:nvSpPr>
+          <p:cNvPr id="2" name="标题 1">
+            <a:extLst>
+              <a:ext uri="{FF2B5EF4-FFF2-40B4-BE49-F238E27FC236}">
+                <a16:creationId xmlns:a16="http://schemas.microsoft.com/office/drawing/2014/main" id="{052E1AAD-5B80-2742-8EF2-D7CB2877733C}"/>
+              </a:ext>
+            </a:extLst>
+          </p:cNvPr>
+          <p:cNvSpPr>
+            <a:spLocks noGrp="1"/>
+          </p:cNvSpPr>
+          <p:nvPr>
+            <p:ph type="title"/>
+          </p:nvPr>
+        </p:nvSpPr>
+        <p:spPr/>
+        <p:txBody>
+          <a:bodyPr/>
+          <a:lstStyle/>
+          <a:p>
+            <a:r>
+              <a:rPr kumimoji="1" lang="en-US" altLang="zh-CN"/>
+              <a:t>Fuzzy Clustering</a:t>
+            </a:r>
+            <a:endParaRPr kumimoji="1" lang="zh-CN" altLang="en-US"/>
+          </a:p>
+        </p:txBody>
+      </p:sp>
+      <p:sp>
+        <p:nvSpPr>
+          <p:cNvPr id="3" name="内容占位符 2">
+            <a:extLst>
+              <a:ext uri="{FF2B5EF4-FFF2-40B4-BE49-F238E27FC236}">
+                <a16:creationId xmlns:a16="http://schemas.microsoft.com/office/drawing/2014/main" id="{E489E4C4-940D-5640-97CE-84FC9C12C31B}"/>
+              </a:ext>
+            </a:extLst>
+          </p:cNvPr>
+          <p:cNvSpPr>
+            <a:spLocks noGrp="1"/>
+          </p:cNvSpPr>
+          <p:nvPr>
+            <p:ph sz="half" idx="1"/>
+          </p:nvPr>
+        </p:nvSpPr>
+        <p:spPr/>
+        <p:txBody>
+          <a:bodyPr/>
+          <a:lstStyle/>
+          <a:p>
+            <a:r>
+              <a:rPr kumimoji="1" lang="en-US" altLang="zh-CN"/>
+              <a:t>A point is assigned to a cluster based on a probability.</a:t>
+            </a:r>
+          </a:p>
+          <a:p>
+            <a:r>
+              <a:rPr kumimoji="1" lang="en-US" altLang="zh-CN"/>
+              <a:t>Strategy of iteration is similar to K-means or K-medoids.</a:t>
+            </a:r>
+          </a:p>
+          <a:p>
+            <a:r>
+              <a:rPr kumimoji="1" lang="en-US" altLang="zh-CN"/>
+              <a:t>More parameters need to be determined by experiments.</a:t>
+            </a:r>
+            <a:endParaRPr kumimoji="1" lang="zh-CN" altLang="en-US"/>
+          </a:p>
+        </p:txBody>
+      </p:sp>
+      <p:pic>
+        <p:nvPicPr>
+          <p:cNvPr id="14" name="内容占位符 13">
+            <a:extLst>
+              <a:ext uri="{FF2B5EF4-FFF2-40B4-BE49-F238E27FC236}">
+                <a16:creationId xmlns:a16="http://schemas.microsoft.com/office/drawing/2014/main" id="{D1BA4D18-2B74-CF41-9440-10D4982D0D9E}"/>
+              </a:ext>
+            </a:extLst>
+          </p:cNvPr>
+          <p:cNvPicPr>
+            <a:picLocks noGrp="1" noChangeAspect="1"/>
+          </p:cNvPicPr>
+          <p:nvPr>
+            <p:ph sz="half" idx="2"/>
+          </p:nvPr>
+        </p:nvPicPr>
+        <p:blipFill>
+          <a:blip r:embed="rId2"/>
+          <a:stretch>
+            <a:fillRect/>
+          </a:stretch>
+        </p:blipFill>
+        <p:spPr>
+          <a:xfrm>
+            <a:off x="6172200" y="2058194"/>
+            <a:ext cx="5181600" cy="3886200"/>
+          </a:xfrm>
+        </p:spPr>
+      </p:pic>
+    </p:spTree>
+    <p:extLst>
+      <p:ext uri="{BB962C8B-B14F-4D97-AF65-F5344CB8AC3E}">
+        <p14:creationId xmlns:p14="http://schemas.microsoft.com/office/powerpoint/2010/main" val="7479119"/>
       </p:ext>
     </p:extLst>
   </p:cSld>

</xml_diff>